<commit_message>
# Result PPTX from DPS count vs Project Score # RMD file for getting percentage of DPS distribution in projects
</commit_message>
<xml_diff>
--- a/Analysis by Quantile Values Nov 2018/From_Python_script/PS Count + Score + Quantile Merged/Fit Model.pptx
+++ b/Analysis by Quantile Values Nov 2018/From_Python_script/PS Count + Score + Quantile Merged/Fit Model.pptx
@@ -2985,7 +2985,7 @@
         <p:spPr>
           <a:xfrm>
             <a:off x="228600" y="6578600"/>
-            <a:ext cx="3663404" cy="279400"/>
+            <a:ext cx="3182763" cy="279400"/>
           </a:xfrm>
           <a:prstGeom prst="rect">
             <a:avLst/>
@@ -3000,7 +3000,7 @@
           <a:p>
             <a:r>
               <a:rPr lang="en-US" dirty="0" smtClean="0"/>
-              <a:t>Response DPS count &gt; Whole Model</a:t>
+              <a:t>Response Score &gt; Whole Model</a:t>
             </a:r>
             <a:endParaRPr lang="en-US" dirty="0"/>
           </a:p>
@@ -3054,7 +3054,7 @@
         <p:spPr>
           <a:xfrm>
             <a:off x="3219450" y="952500"/>
-            <a:ext cx="5981700" cy="4481863"/>
+            <a:ext cx="5981700" cy="4521880"/>
           </a:xfrm>
           <a:prstGeom prst="rect">
             <a:avLst/>
@@ -3100,7 +3100,7 @@
         <p:spPr>
           <a:xfrm>
             <a:off x="228600" y="6578600"/>
-            <a:ext cx="3663404" cy="279400"/>
+            <a:ext cx="3182763" cy="279400"/>
           </a:xfrm>
           <a:prstGeom prst="rect">
             <a:avLst/>
@@ -3115,7 +3115,7 @@
           <a:p>
             <a:r>
               <a:rPr lang="en-US" dirty="0" smtClean="0"/>
-              <a:t>Response DPS count &gt; Whole Model</a:t>
+              <a:t>Response Score &gt; Whole Model</a:t>
             </a:r>
             <a:endParaRPr lang="en-US" dirty="0"/>
           </a:p>
@@ -3169,7 +3169,7 @@
         <p:spPr>
           <a:xfrm>
             <a:off x="3219450" y="952500"/>
-            <a:ext cx="5981700" cy="4728895"/>
+            <a:ext cx="5981700" cy="4771117"/>
           </a:xfrm>
           <a:prstGeom prst="rect">
             <a:avLst/>
@@ -3215,7 +3215,7 @@
         <p:spPr>
           <a:xfrm>
             <a:off x="228600" y="6578600"/>
-            <a:ext cx="3663404" cy="279400"/>
+            <a:ext cx="3182763" cy="279400"/>
           </a:xfrm>
           <a:prstGeom prst="rect">
             <a:avLst/>
@@ -3230,7 +3230,7 @@
           <a:p>
             <a:r>
               <a:rPr lang="en-US" dirty="0" smtClean="0"/>
-              <a:t>Response DPS count &gt; Whole Model</a:t>
+              <a:t>Response Score &gt; Whole Model</a:t>
             </a:r>
             <a:endParaRPr lang="en-US" dirty="0"/>
           </a:p>
@@ -3392,7 +3392,7 @@
                       <a:pPr algn="r"/>
                       <a:r>
                         <a:rPr dirty="0" smtClean="0"/>
-                        <a:t>57</a:t>
+                        <a:t>72</a:t>
                       </a:r>
                       <a:endParaRPr lang="en-US" dirty="0"/>
                     </a:p>
@@ -3407,7 +3407,7 @@
                       <a:pPr algn="r"/>
                       <a:r>
                         <a:rPr dirty="0" smtClean="0"/>
-                        <a:t>641072.7</a:t>
+                        <a:t>5.1833982</a:t>
                       </a:r>
                       <a:endParaRPr lang="en-US" dirty="0"/>
                     </a:p>
@@ -3422,7 +3422,7 @@
                       <a:pPr algn="r"/>
                       <a:r>
                         <a:rPr dirty="0" smtClean="0"/>
-                        <a:t>11246.9</a:t>
+                        <a:t>0.071992</a:t>
                       </a:r>
                       <a:endParaRPr lang="en-US" dirty="0"/>
                     </a:p>
@@ -3437,7 +3437,7 @@
                       <a:pPr algn="r"/>
                       <a:r>
                         <a:rPr dirty="0" smtClean="0"/>
-                        <a:t>0.7983</a:t>
+                        <a:t>0.5834</a:t>
                       </a:r>
                       <a:endParaRPr lang="en-US" dirty="0"/>
                     </a:p>
@@ -3468,7 +3468,7 @@
                       <a:pPr algn="r"/>
                       <a:r>
                         <a:rPr dirty="0" smtClean="0"/>
-                        <a:t>39</a:t>
+                        <a:t>24</a:t>
                       </a:r>
                       <a:endParaRPr lang="en-US" dirty="0"/>
                     </a:p>
@@ -3483,7 +3483,7 @@
                       <a:pPr algn="r"/>
                       <a:r>
                         <a:rPr dirty="0" smtClean="0"/>
-                        <a:t>549428.0</a:t>
+                        <a:t>2.9613818</a:t>
                       </a:r>
                       <a:endParaRPr lang="en-US" dirty="0"/>
                     </a:p>
@@ -3498,7 +3498,7 @@
                       <a:pPr algn="r"/>
                       <a:r>
                         <a:rPr dirty="0" smtClean="0"/>
-                        <a:t>14087.9</a:t>
+                        <a:t>0.123391</a:t>
                       </a:r>
                       <a:endParaRPr lang="en-US" dirty="0"/>
                     </a:p>
@@ -3559,7 +3559,7 @@
                       <a:pPr algn="r"/>
                       <a:r>
                         <a:rPr dirty="0" smtClean="0"/>
-                        <a:t>1190500.7</a:t>
+                        <a:t>8.1447799</a:t>
                       </a:r>
                       <a:endParaRPr lang="en-US" dirty="0"/>
                     </a:p>
@@ -3589,7 +3589,7 @@
                       <a:pPr algn="r"/>
                       <a:r>
                         <a:rPr dirty="0" smtClean="0"/>
-                        <a:t>0.7839</a:t>
+                        <a:t>0.9581</a:t>
                       </a:r>
                       <a:endParaRPr lang="en-US" dirty="0"/>
                     </a:p>
@@ -3741,7 +3741,7 @@
                       <a:pPr algn="r"/>
                       <a:r>
                         <a:rPr dirty="0" smtClean="0"/>
-                        <a:t>0.5596</a:t>
+                        <a:t>0.6530</a:t>
                       </a:r>
                       <a:endParaRPr lang="en-US" dirty="0"/>
                     </a:p>
@@ -3792,7 +3792,7 @@
         <p:spPr>
           <a:xfrm>
             <a:off x="228600" y="6578600"/>
-            <a:ext cx="3663404" cy="279400"/>
+            <a:ext cx="3182763" cy="279400"/>
           </a:xfrm>
           <a:prstGeom prst="rect">
             <a:avLst/>
@@ -3807,7 +3807,7 @@
           <a:p>
             <a:r>
               <a:rPr lang="en-US" dirty="0" smtClean="0"/>
-              <a:t>Response DPS count &gt; Whole Model</a:t>
+              <a:t>Response Score &gt; Whole Model</a:t>
             </a:r>
             <a:endParaRPr lang="en-US" dirty="0"/>
           </a:p>
@@ -3861,7 +3861,7 @@
         <p:spPr>
           <a:xfrm>
             <a:off x="3219450" y="952500"/>
-            <a:ext cx="5981700" cy="2128457"/>
+            <a:ext cx="5981700" cy="2141596"/>
           </a:xfrm>
           <a:prstGeom prst="rect">
             <a:avLst/>
@@ -3907,7 +3907,7 @@
         <p:spPr>
           <a:xfrm>
             <a:off x="228600" y="6578600"/>
-            <a:ext cx="3663404" cy="279400"/>
+            <a:ext cx="3182763" cy="279400"/>
           </a:xfrm>
           <a:prstGeom prst="rect">
             <a:avLst/>
@@ -3922,7 +3922,7 @@
           <a:p>
             <a:r>
               <a:rPr lang="en-US" dirty="0" smtClean="0"/>
-              <a:t>Response DPS count &gt; Whole Model</a:t>
+              <a:t>Response Score &gt; Whole Model</a:t>
             </a:r>
             <a:endParaRPr lang="en-US" dirty="0"/>
           </a:p>
@@ -4072,7 +4072,7 @@
                       <a:pPr algn="r"/>
                       <a:r>
                         <a:rPr dirty="0" smtClean="0"/>
-                        <a:t>111.36</a:t>
+                        <a:t>0.291276</a:t>
                       </a:r>
                       <a:endParaRPr lang="en-US" dirty="0"/>
                     </a:p>
@@ -4103,7 +4103,7 @@
                       <a:pPr algn="r"/>
                       <a:r>
                         <a:rPr dirty="0" smtClean="0"/>
-                        <a:t>103.6633</a:t>
+                        <a:t>0.791569</a:t>
                       </a:r>
                       <a:endParaRPr lang="en-US" dirty="0"/>
                     </a:p>
@@ -4185,7 +4185,7 @@
         <p:spPr>
           <a:xfrm>
             <a:off x="228600" y="6578600"/>
-            <a:ext cx="3663404" cy="279400"/>
+            <a:ext cx="3182763" cy="279400"/>
           </a:xfrm>
           <a:prstGeom prst="rect">
             <a:avLst/>
@@ -4200,7 +4200,7 @@
           <a:p>
             <a:r>
               <a:rPr lang="en-US" dirty="0" smtClean="0"/>
-              <a:t>Response DPS count &gt; Whole Model</a:t>
+              <a:t>Response Score &gt; Whole Model</a:t>
             </a:r>
             <a:endParaRPr lang="en-US" dirty="0"/>
           </a:p>
@@ -4377,7 +4377,7 @@
                       <a:pPr algn="r"/>
                       <a:r>
                         <a:rPr dirty="0" smtClean="0"/>
-                        <a:t>56945.2</a:t>
+                        <a:t>0.3895890</a:t>
                       </a:r>
                       <a:endParaRPr lang="en-US" dirty="0"/>
                     </a:p>
@@ -4392,7 +4392,7 @@
                       <a:pPr algn="r"/>
                       <a:r>
                         <a:rPr dirty="0" smtClean="0"/>
-                        <a:t>56945.2</a:t>
+                        <a:t>0.389589</a:t>
                       </a:r>
                       <a:endParaRPr lang="en-US" dirty="0"/>
                     </a:p>
@@ -4453,7 +4453,7 @@
                       <a:pPr algn="r"/>
                       <a:r>
                         <a:rPr dirty="0" smtClean="0"/>
-                        <a:t>1190500.7</a:t>
+                        <a:t>8.1447799</a:t>
                       </a:r>
                       <a:endParaRPr lang="en-US" dirty="0"/>
                     </a:p>
@@ -4468,7 +4468,7 @@
                       <a:pPr algn="r"/>
                       <a:r>
                         <a:rPr dirty="0" smtClean="0"/>
-                        <a:t>12401.0</a:t>
+                        <a:t>0.084841</a:t>
                       </a:r>
                       <a:endParaRPr lang="en-US" dirty="0"/>
                     </a:p>
@@ -4529,7 +4529,7 @@
                       <a:pPr algn="r"/>
                       <a:r>
                         <a:rPr dirty="0" smtClean="0"/>
-                        <a:t>1247445.9</a:t>
+                        <a:t>8.5343689</a:t>
                       </a:r>
                       <a:endParaRPr lang="en-US" dirty="0"/>
                     </a:p>
@@ -4614,7 +4614,7 @@
         <p:spPr>
           <a:xfrm>
             <a:off x="228600" y="6578600"/>
-            <a:ext cx="3663404" cy="279400"/>
+            <a:ext cx="3182763" cy="279400"/>
           </a:xfrm>
           <a:prstGeom prst="rect">
             <a:avLst/>
@@ -4629,7 +4629,7 @@
           <a:p>
             <a:r>
               <a:rPr lang="en-US" dirty="0" smtClean="0"/>
-              <a:t>Response DPS count &gt; Whole Model</a:t>
+              <a:t>Response Score &gt; Whole Model</a:t>
             </a:r>
             <a:endParaRPr lang="en-US" dirty="0"/>
           </a:p>
@@ -4691,11 +4691,11 @@
                 <a:tableStyleId>{5C22544A-7EE6-4342-B048-85BDC9FD1C3A}</a:tableStyleId>
               </a:tblPr>
               <a:tblGrid>
-                <a:gridCol w="1865858"/>
-                <a:gridCol w="2401283"/>
-                <a:gridCol w="2102184"/>
-                <a:gridCol w="1424493"/>
-                <a:gridCol w="1802300"/>
+                <a:gridCol w="2094383"/>
+                <a:gridCol w="2323134"/>
+                <a:gridCol w="2057843"/>
+                <a:gridCol w="1377683"/>
+                <a:gridCol w="1743074"/>
               </a:tblGrid>
               <a:tr h="0">
                 <a:tc>
@@ -4791,7 +4791,7 @@
                       <a:pPr algn="r"/>
                       <a:r>
                         <a:rPr dirty="0" smtClean="0"/>
-                        <a:t>39.003898</a:t>
+                        <a:t>0.7336369</a:t>
                       </a:r>
                       <a:endParaRPr lang="en-US" dirty="0"/>
                     </a:p>
@@ -4806,7 +4806,7 @@
                       <a:pPr algn="r"/>
                       <a:r>
                         <a:rPr dirty="0" smtClean="0"/>
-                        <a:t>32.20262</a:t>
+                        <a:t>0.039957</a:t>
                       </a:r>
                       <a:endParaRPr lang="en-US" dirty="0"/>
                     </a:p>
@@ -4821,22 +4821,26 @@
                       <a:pPr algn="r"/>
                       <a:r>
                         <a:rPr dirty="0" smtClean="0"/>
-                        <a:t>1.21</a:t>
-                      </a:r>
-                      <a:endParaRPr lang="en-US" dirty="0"/>
-                    </a:p>
-                  </a:txBody>
-                  <a:tcPr/>
-                </a:tc>
-                <a:tc>
-                  <a:txBody>
-                    <a:bodyPr/>
-                    <a:lstStyle/>
-                    <a:p>
-                      <a:pPr algn="r"/>
-                      <a:r>
-                        <a:rPr dirty="0" smtClean="0"/>
-                        <a:t>0.2288</a:t>
+                        <a:t>18.36</a:t>
+                      </a:r>
+                      <a:endParaRPr lang="en-US" dirty="0"/>
+                    </a:p>
+                  </a:txBody>
+                  <a:tcPr/>
+                </a:tc>
+                <a:tc>
+                  <a:txBody>
+                    <a:bodyPr/>
+                    <a:lstStyle/>
+                    <a:p>
+                      <a:pPr algn="r"/>
+                      <a:r>
+                        <a:rPr dirty="0" smtClean="0">
+                          <a:solidFill>
+                            <a:srgbClr val="e57406"/>
+                          </a:solidFill>
+                        </a:rPr>
+                        <a:t>&lt;.0001*</a:t>
                       </a:r>
                       <a:endParaRPr lang="en-US" dirty="0"/>
                     </a:p>
@@ -4852,7 +4856,7 @@
                     <a:p>
                       <a:r>
                         <a:rPr dirty="0" smtClean="0"/>
-                        <a:t>Score</a:t>
+                        <a:t>DPS count</a:t>
                       </a:r>
                       <a:endParaRPr lang="en-US" dirty="0"/>
                     </a:p>
@@ -4867,7 +4871,7 @@
                       <a:pPr algn="r"/>
                       <a:r>
                         <a:rPr dirty="0" smtClean="0"/>
-                        <a:t>81.68509</a:t>
+                        <a:t>0.0005588</a:t>
                       </a:r>
                       <a:endParaRPr lang="en-US" dirty="0"/>
                     </a:p>
@@ -4882,7 +4886,7 @@
                       <a:pPr algn="r"/>
                       <a:r>
                         <a:rPr dirty="0" smtClean="0"/>
-                        <a:t>38.11918</a:t>
+                        <a:t>0.000261</a:t>
                       </a:r>
                       <a:endParaRPr lang="en-US" dirty="0"/>
                     </a:p>
@@ -4982,7 +4986,7 @@
           <a:p>
             <a:r>
               <a:rPr lang="en-US" dirty="0" smtClean="0"/>
-              <a:t>Response DPS count &gt; Score</a:t>
+              <a:t>Response Score &gt; DPS count</a:t>
             </a:r>
             <a:endParaRPr lang="en-US" dirty="0"/>
           </a:p>
@@ -5036,7 +5040,7 @@
         <p:spPr>
           <a:xfrm>
             <a:off x="3219450" y="952500"/>
-            <a:ext cx="5981700" cy="4481863"/>
+            <a:ext cx="5981700" cy="4521880"/>
           </a:xfrm>
           <a:prstGeom prst="rect">
             <a:avLst/>

</xml_diff>